<commit_message>
Update 2. Modelamiento e Optimización.pptx
</commit_message>
<xml_diff>
--- a/1. Lectures/Introducción a la Optimización aplicada a Sistemas de Energía Eléctrica/2. Modelamiento e Optimización.pptx
+++ b/1. Lectures/Introducción a la Optimización aplicada a Sistemas de Energía Eléctrica/2. Modelamiento e Optimización.pptx
@@ -5,16 +5,15 @@
     <p:sldMasterId id="2147483732" r:id="rId1"/>
   </p:sldMasterIdLst>
   <p:notesMasterIdLst>
-    <p:notesMasterId r:id="rId6"/>
+    <p:notesMasterId r:id="rId5"/>
   </p:notesMasterIdLst>
   <p:handoutMasterIdLst>
-    <p:handoutMasterId r:id="rId7"/>
+    <p:handoutMasterId r:id="rId6"/>
   </p:handoutMasterIdLst>
   <p:sldIdLst>
     <p:sldId id="256" r:id="rId2"/>
     <p:sldId id="393" r:id="rId3"/>
-    <p:sldId id="258" r:id="rId4"/>
-    <p:sldId id="305" r:id="rId5"/>
+    <p:sldId id="394" r:id="rId4"/>
   </p:sldIdLst>
   <p:sldSz cx="9144000" cy="6858000" type="screen4x3"/>
   <p:notesSz cx="6858000" cy="9144000"/>
@@ -120,8 +119,7 @@
           <p14:sldIdLst>
             <p14:sldId id="256"/>
             <p14:sldId id="393"/>
-            <p14:sldId id="258"/>
-            <p14:sldId id="305"/>
+            <p14:sldId id="394"/>
           </p14:sldIdLst>
         </p14:section>
       </p14:sectionLst>
@@ -768,113 +766,6 @@
     <p:extLst>
       <p:ext uri="{BB962C8B-B14F-4D97-AF65-F5344CB8AC3E}">
         <p14:creationId xmlns:p14="http://schemas.microsoft.com/office/powerpoint/2010/main" val="4225441261"/>
-      </p:ext>
-    </p:extLst>
-  </p:cSld>
-  <p:clrMapOvr>
-    <a:masterClrMapping/>
-  </p:clrMapOvr>
-</p:notes>
-</file>
-
-<file path=ppt/notesSlides/notesSlide2.xml><?xml version="1.0" encoding="utf-8"?>
-<p:notes xmlns:a="http://schemas.openxmlformats.org/drawingml/2006/main" xmlns:r="http://schemas.openxmlformats.org/officeDocument/2006/relationships" xmlns:p="http://schemas.openxmlformats.org/presentationml/2006/main">
-  <p:cSld>
-    <p:spTree>
-      <p:nvGrpSpPr>
-        <p:cNvPr id="1" name=""/>
-        <p:cNvGrpSpPr/>
-        <p:nvPr/>
-      </p:nvGrpSpPr>
-      <p:grpSpPr>
-        <a:xfrm>
-          <a:off x="0" y="0"/>
-          <a:ext cx="0" cy="0"/>
-          <a:chOff x="0" y="0"/>
-          <a:chExt cx="0" cy="0"/>
-        </a:xfrm>
-      </p:grpSpPr>
-      <p:sp>
-        <p:nvSpPr>
-          <p:cNvPr id="2" name="1 Marcador de imagen de diapositiva"/>
-          <p:cNvSpPr>
-            <a:spLocks noGrp="1" noRot="1" noChangeAspect="1"/>
-          </p:cNvSpPr>
-          <p:nvPr>
-            <p:ph type="sldImg"/>
-          </p:nvPr>
-        </p:nvSpPr>
-        <p:spPr/>
-      </p:sp>
-      <p:sp>
-        <p:nvSpPr>
-          <p:cNvPr id="3" name="2 Marcador de notas"/>
-          <p:cNvSpPr>
-            <a:spLocks noGrp="1"/>
-          </p:cNvSpPr>
-          <p:nvPr>
-            <p:ph type="body" idx="1"/>
-          </p:nvPr>
-        </p:nvSpPr>
-        <p:spPr/>
-        <p:txBody>
-          <a:bodyPr/>
-          <a:lstStyle/>
-          <a:p>
-            <a:endParaRPr lang="es-ES" dirty="0"/>
-          </a:p>
-        </p:txBody>
-      </p:sp>
-      <p:sp>
-        <p:nvSpPr>
-          <p:cNvPr id="4" name="3 Marcador de número de diapositiva"/>
-          <p:cNvSpPr>
-            <a:spLocks noGrp="1"/>
-          </p:cNvSpPr>
-          <p:nvPr>
-            <p:ph type="sldNum" sz="quarter" idx="10"/>
-          </p:nvPr>
-        </p:nvSpPr>
-        <p:spPr/>
-        <p:txBody>
-          <a:bodyPr/>
-          <a:lstStyle/>
-          <a:p>
-            <a:fld id="{8AD6E850-6E96-4E89-86F1-2DE46BB95531}" type="slidenum">
-              <a:rPr lang="es-ES" smtClean="0"/>
-              <a:pPr/>
-              <a:t>3</a:t>
-            </a:fld>
-            <a:endParaRPr lang="es-ES"/>
-          </a:p>
-        </p:txBody>
-      </p:sp>
-      <p:sp>
-        <p:nvSpPr>
-          <p:cNvPr id="5" name="4 Marcador de encabezado"/>
-          <p:cNvSpPr>
-            <a:spLocks noGrp="1"/>
-          </p:cNvSpPr>
-          <p:nvPr>
-            <p:ph type="hdr" sz="quarter" idx="11"/>
-          </p:nvPr>
-        </p:nvSpPr>
-        <p:spPr/>
-        <p:txBody>
-          <a:bodyPr/>
-          <a:lstStyle/>
-          <a:p>
-            <a:r>
-              <a:rPr lang="es-ES"/>
-              <a:t>Proyecto CanSat</a:t>
-            </a:r>
-          </a:p>
-        </p:txBody>
-      </p:sp>
-    </p:spTree>
-    <p:extLst>
-      <p:ext uri="{BB962C8B-B14F-4D97-AF65-F5344CB8AC3E}">
-        <p14:creationId xmlns:p14="http://schemas.microsoft.com/office/powerpoint/2010/main" val="2568092354"/>
       </p:ext>
     </p:extLst>
   </p:cSld>
@@ -5401,12 +5292,8 @@
           </a:lstStyle>
           <a:p>
             <a:r>
-              <a:rPr lang="en-US" altLang="en-US" dirty="0" err="1"/>
-              <a:t>Ejemplo</a:t>
-            </a:r>
-            <a:r>
-              <a:rPr lang="en-US" altLang="en-US" dirty="0"/>
-              <a:t> 1</a:t>
+              <a:rPr lang="es-PE" altLang="en-US" dirty="0"/>
+              <a:t>Ejemplo 1</a:t>
             </a:r>
           </a:p>
         </p:txBody>
@@ -5419,8 +5306,8 @@
         </p:nvSpPr>
         <p:spPr>
           <a:xfrm>
-            <a:off x="827584" y="1196752"/>
-            <a:ext cx="1331775" cy="369332"/>
+            <a:off x="602191" y="836712"/>
+            <a:ext cx="8002257" cy="1323439"/>
           </a:xfrm>
           <a:prstGeom prst="rect">
             <a:avLst/>
@@ -5428,16 +5315,348 @@
           <a:noFill/>
         </p:spPr>
         <p:txBody>
-          <a:bodyPr wrap="none" rtlCol="0">
+          <a:bodyPr wrap="square" rtlCol="0">
             <a:spAutoFit/>
           </a:bodyPr>
           <a:lstStyle/>
           <a:p>
-            <a:r>
-              <a:rPr lang="es-PE"/>
-              <a:t>Una refinería </a:t>
-            </a:r>
-            <a:endParaRPr lang="es-PE"/>
+            <a:pPr marL="285750" indent="-285750">
+              <a:buFont typeface="Arial" panose="020B0604020202020204" pitchFamily="34" charset="0"/>
+              <a:buChar char="•"/>
+            </a:pPr>
+            <a:r>
+              <a:rPr lang="es-MX" sz="2000" dirty="0"/>
+              <a:t>Una refinería puede comprar petróleo crudo ligero y petróleo crudo pesado. </a:t>
+            </a:r>
+          </a:p>
+          <a:p>
+            <a:pPr marL="285750" indent="-285750">
+              <a:buFont typeface="Arial" panose="020B0604020202020204" pitchFamily="34" charset="0"/>
+              <a:buChar char="•"/>
+            </a:pPr>
+            <a:r>
+              <a:rPr lang="es-MX" sz="2000" dirty="0"/>
+              <a:t>El coste por barril de estos tipos de petróleo es de 11 y 9 euros, respectivamente. </a:t>
+            </a:r>
+          </a:p>
+          <a:p>
+            <a:pPr marL="285750" indent="-285750">
+              <a:buFont typeface="Arial" panose="020B0604020202020204" pitchFamily="34" charset="0"/>
+              <a:buChar char="•"/>
+            </a:pPr>
+            <a:r>
+              <a:rPr lang="es-MX" sz="2000" dirty="0"/>
+              <a:t>De cada tipo de petróleo se producen por barril las siguientes cantidades de gasolina, kerosene y combustible para reactores</a:t>
+            </a:r>
+            <a:r>
+              <a:rPr lang="es-PE" sz="2000" dirty="0"/>
+              <a:t> </a:t>
+            </a:r>
+          </a:p>
+        </p:txBody>
+      </p:sp>
+      <p:graphicFrame>
+        <p:nvGraphicFramePr>
+          <p:cNvPr id="4" name="Tabla 3"/>
+          <p:cNvGraphicFramePr>
+            <a:graphicFrameLocks noGrp="1"/>
+          </p:cNvGraphicFramePr>
+          <p:nvPr>
+            <p:extLst>
+              <p:ext uri="{D42A27DB-BD31-4B8C-83A1-F6EECF244321}">
+                <p14:modId xmlns:p14="http://schemas.microsoft.com/office/powerpoint/2010/main" val="1949808647"/>
+              </p:ext>
+            </p:extLst>
+          </p:nvPr>
+        </p:nvGraphicFramePr>
+        <p:xfrm>
+          <a:off x="1323954" y="2351103"/>
+          <a:ext cx="6558729" cy="1112520"/>
+        </p:xfrm>
+        <a:graphic>
+          <a:graphicData uri="http://schemas.openxmlformats.org/drawingml/2006/table">
+            <a:tbl>
+              <a:tblPr firstRow="1" bandRow="1">
+                <a:tableStyleId>{69012ECD-51FC-41F1-AA8D-1B2483CD663E}</a:tableStyleId>
+              </a:tblPr>
+              <a:tblGrid>
+                <a:gridCol w="2169609">
+                  <a:extLst>
+                    <a:ext uri="{9D8B030D-6E8A-4147-A177-3AD203B41FA5}">
+                      <a16:colId xmlns:a16="http://schemas.microsoft.com/office/drawing/2014/main" val="1387785101"/>
+                    </a:ext>
+                  </a:extLst>
+                </a:gridCol>
+                <a:gridCol w="1463040">
+                  <a:extLst>
+                    <a:ext uri="{9D8B030D-6E8A-4147-A177-3AD203B41FA5}">
+                      <a16:colId xmlns:a16="http://schemas.microsoft.com/office/drawing/2014/main" val="862367707"/>
+                    </a:ext>
+                  </a:extLst>
+                </a:gridCol>
+                <a:gridCol w="1463040">
+                  <a:extLst>
+                    <a:ext uri="{9D8B030D-6E8A-4147-A177-3AD203B41FA5}">
+                      <a16:colId xmlns:a16="http://schemas.microsoft.com/office/drawing/2014/main" val="3989843849"/>
+                    </a:ext>
+                  </a:extLst>
+                </a:gridCol>
+                <a:gridCol w="1463040">
+                  <a:extLst>
+                    <a:ext uri="{9D8B030D-6E8A-4147-A177-3AD203B41FA5}">
+                      <a16:colId xmlns:a16="http://schemas.microsoft.com/office/drawing/2014/main" val="3980836442"/>
+                    </a:ext>
+                  </a:extLst>
+                </a:gridCol>
+              </a:tblGrid>
+              <a:tr h="370840">
+                <a:tc>
+                  <a:txBody>
+                    <a:bodyPr/>
+                    <a:lstStyle/>
+                    <a:p>
+                      <a:endParaRPr lang="es-PE" dirty="0"/>
+                    </a:p>
+                  </a:txBody>
+                  <a:tcPr/>
+                </a:tc>
+                <a:tc>
+                  <a:txBody>
+                    <a:bodyPr/>
+                    <a:lstStyle/>
+                    <a:p>
+                      <a:pPr algn="ctr"/>
+                      <a:r>
+                        <a:rPr lang="es-PE" dirty="0"/>
+                        <a:t>Gasolina</a:t>
+                      </a:r>
+                    </a:p>
+                  </a:txBody>
+                  <a:tcPr/>
+                </a:tc>
+                <a:tc>
+                  <a:txBody>
+                    <a:bodyPr/>
+                    <a:lstStyle/>
+                    <a:p>
+                      <a:pPr algn="ctr"/>
+                      <a:r>
+                        <a:rPr lang="es-PE" dirty="0"/>
+                        <a:t>Kerosene</a:t>
+                      </a:r>
+                    </a:p>
+                  </a:txBody>
+                  <a:tcPr/>
+                </a:tc>
+                <a:tc>
+                  <a:txBody>
+                    <a:bodyPr/>
+                    <a:lstStyle/>
+                    <a:p>
+                      <a:pPr algn="ctr"/>
+                      <a:r>
+                        <a:rPr lang="es-PE" dirty="0"/>
+                        <a:t>Combustible</a:t>
+                      </a:r>
+                    </a:p>
+                  </a:txBody>
+                  <a:tcPr/>
+                </a:tc>
+                <a:extLst>
+                  <a:ext uri="{0D108BD9-81ED-4DB2-BD59-A6C34878D82A}">
+                    <a16:rowId xmlns:a16="http://schemas.microsoft.com/office/drawing/2014/main" val="385669016"/>
+                  </a:ext>
+                </a:extLst>
+              </a:tr>
+              <a:tr h="370840">
+                <a:tc>
+                  <a:txBody>
+                    <a:bodyPr/>
+                    <a:lstStyle/>
+                    <a:p>
+                      <a:r>
+                        <a:rPr lang="es-PE" dirty="0"/>
+                        <a:t>Petróleo</a:t>
+                      </a:r>
+                      <a:r>
+                        <a:rPr lang="es-PE" baseline="0" dirty="0"/>
+                        <a:t> crudo ligero</a:t>
+                      </a:r>
+                      <a:endParaRPr lang="es-PE" dirty="0"/>
+                    </a:p>
+                  </a:txBody>
+                  <a:tcPr/>
+                </a:tc>
+                <a:tc>
+                  <a:txBody>
+                    <a:bodyPr/>
+                    <a:lstStyle/>
+                    <a:p>
+                      <a:pPr algn="ctr"/>
+                      <a:r>
+                        <a:rPr lang="es-PE" dirty="0"/>
+                        <a:t>0.40</a:t>
+                      </a:r>
+                    </a:p>
+                  </a:txBody>
+                  <a:tcPr/>
+                </a:tc>
+                <a:tc>
+                  <a:txBody>
+                    <a:bodyPr/>
+                    <a:lstStyle/>
+                    <a:p>
+                      <a:pPr algn="ctr"/>
+                      <a:r>
+                        <a:rPr lang="es-PE" dirty="0"/>
+                        <a:t>0.20</a:t>
+                      </a:r>
+                    </a:p>
+                  </a:txBody>
+                  <a:tcPr/>
+                </a:tc>
+                <a:tc>
+                  <a:txBody>
+                    <a:bodyPr/>
+                    <a:lstStyle/>
+                    <a:p>
+                      <a:pPr algn="ctr"/>
+                      <a:r>
+                        <a:rPr lang="es-PE" dirty="0"/>
+                        <a:t>0.35</a:t>
+                      </a:r>
+                    </a:p>
+                  </a:txBody>
+                  <a:tcPr/>
+                </a:tc>
+                <a:extLst>
+                  <a:ext uri="{0D108BD9-81ED-4DB2-BD59-A6C34878D82A}">
+                    <a16:rowId xmlns:a16="http://schemas.microsoft.com/office/drawing/2014/main" val="1803704957"/>
+                  </a:ext>
+                </a:extLst>
+              </a:tr>
+              <a:tr h="370840">
+                <a:tc>
+                  <a:txBody>
+                    <a:bodyPr/>
+                    <a:lstStyle/>
+                    <a:p>
+                      <a:r>
+                        <a:rPr lang="es-PE" dirty="0"/>
+                        <a:t>Petróleo</a:t>
+                      </a:r>
+                      <a:r>
+                        <a:rPr lang="es-PE" baseline="0" dirty="0"/>
+                        <a:t> crudo pesado</a:t>
+                      </a:r>
+                      <a:endParaRPr lang="es-PE" dirty="0"/>
+                    </a:p>
+                  </a:txBody>
+                  <a:tcPr/>
+                </a:tc>
+                <a:tc>
+                  <a:txBody>
+                    <a:bodyPr/>
+                    <a:lstStyle/>
+                    <a:p>
+                      <a:pPr algn="ctr"/>
+                      <a:r>
+                        <a:rPr lang="es-PE" dirty="0"/>
+                        <a:t>0.32</a:t>
+                      </a:r>
+                    </a:p>
+                  </a:txBody>
+                  <a:tcPr/>
+                </a:tc>
+                <a:tc>
+                  <a:txBody>
+                    <a:bodyPr/>
+                    <a:lstStyle/>
+                    <a:p>
+                      <a:pPr algn="ctr"/>
+                      <a:r>
+                        <a:rPr lang="es-PE" dirty="0"/>
+                        <a:t>0.40</a:t>
+                      </a:r>
+                    </a:p>
+                  </a:txBody>
+                  <a:tcPr/>
+                </a:tc>
+                <a:tc>
+                  <a:txBody>
+                    <a:bodyPr/>
+                    <a:lstStyle/>
+                    <a:p>
+                      <a:pPr algn="ctr"/>
+                      <a:r>
+                        <a:rPr lang="es-PE" dirty="0"/>
+                        <a:t>0.20</a:t>
+                      </a:r>
+                    </a:p>
+                  </a:txBody>
+                  <a:tcPr/>
+                </a:tc>
+                <a:extLst>
+                  <a:ext uri="{0D108BD9-81ED-4DB2-BD59-A6C34878D82A}">
+                    <a16:rowId xmlns:a16="http://schemas.microsoft.com/office/drawing/2014/main" val="3361610549"/>
+                  </a:ext>
+                </a:extLst>
+              </a:tr>
+            </a:tbl>
+          </a:graphicData>
+        </a:graphic>
+      </p:graphicFrame>
+      <p:sp>
+        <p:nvSpPr>
+          <p:cNvPr id="6" name="CuadroTexto 5"/>
+          <p:cNvSpPr txBox="1"/>
+          <p:nvPr/>
+        </p:nvSpPr>
+        <p:spPr>
+          <a:xfrm>
+            <a:off x="602191" y="3654575"/>
+            <a:ext cx="8002257" cy="2246769"/>
+          </a:xfrm>
+          <a:prstGeom prst="rect">
+            <a:avLst/>
+          </a:prstGeom>
+          <a:noFill/>
+        </p:spPr>
+        <p:txBody>
+          <a:bodyPr wrap="square" rtlCol="0">
+            <a:spAutoFit/>
+          </a:bodyPr>
+          <a:lstStyle/>
+          <a:p>
+            <a:pPr marL="285750" indent="-285750">
+              <a:buFont typeface="Arial" panose="020B0604020202020204" pitchFamily="34" charset="0"/>
+              <a:buChar char="•"/>
+            </a:pPr>
+            <a:r>
+              <a:rPr lang="es-MX" sz="2000" dirty="0"/>
+              <a:t>En el proceso de refinamiento se pierde el 5 % y el 8 % del crudo, respectivamente. </a:t>
+            </a:r>
+          </a:p>
+          <a:p>
+            <a:pPr marL="285750" indent="-285750">
+              <a:buFont typeface="Arial" panose="020B0604020202020204" pitchFamily="34" charset="0"/>
+              <a:buChar char="•"/>
+            </a:pPr>
+            <a:r>
+              <a:rPr lang="es-MX" sz="2000" dirty="0"/>
+              <a:t>La refinería tiene un contrato para entregar un millón de barriles de gasolina, cuatrocientos mil barriles de keroseno, y doscientos cincuenta mil barriles de combustible para reactores. </a:t>
+            </a:r>
+          </a:p>
+          <a:p>
+            <a:pPr marL="285750" indent="-285750">
+              <a:buFont typeface="Arial" panose="020B0604020202020204" pitchFamily="34" charset="0"/>
+              <a:buChar char="•"/>
+            </a:pPr>
+            <a:r>
+              <a:rPr lang="es-MX" sz="2000" dirty="0"/>
+              <a:t>Determine el número de barriles de cada tipo de petróleo crudo que satisfacen la demanda y minimizan el coste. </a:t>
+            </a:r>
+            <a:endParaRPr lang="es-PE" sz="2000" dirty="0"/>
           </a:p>
         </p:txBody>
       </p:sp>
@@ -5500,566 +5719,403 @@
       </p:sp>
       <p:sp>
         <p:nvSpPr>
-          <p:cNvPr id="6" name="Rectangle 3"/>
-          <p:cNvSpPr/>
+          <p:cNvPr id="3" name="4 Título"/>
+          <p:cNvSpPr txBox="1">
+            <a:spLocks/>
+          </p:cNvSpPr>
           <p:nvPr/>
         </p:nvSpPr>
         <p:spPr>
           <a:xfrm>
-            <a:off x="3461473" y="2996818"/>
-            <a:ext cx="1429392" cy="872476"/>
+            <a:off x="611560" y="188640"/>
+            <a:ext cx="8784976" cy="457120"/>
           </a:xfrm>
           <a:prstGeom prst="rect">
             <a:avLst/>
           </a:prstGeom>
-          <a:solidFill>
-            <a:schemeClr val="tx2">
-              <a:lumMod val="40000"/>
-              <a:lumOff val="60000"/>
-              <a:alpha val="17000"/>
-            </a:schemeClr>
-          </a:solidFill>
-          <a:ln>
-            <a:solidFill>
-              <a:schemeClr val="bg1"/>
-            </a:solidFill>
-          </a:ln>
-        </p:spPr>
-        <p:style>
-          <a:lnRef idx="2">
-            <a:schemeClr val="accent1">
-              <a:shade val="50000"/>
-            </a:schemeClr>
-          </a:lnRef>
-          <a:fillRef idx="1">
-            <a:schemeClr val="accent1"/>
-          </a:fillRef>
-          <a:effectRef idx="0">
-            <a:schemeClr val="accent1"/>
-          </a:effectRef>
-          <a:fontRef idx="minor">
-            <a:schemeClr val="lt1"/>
-          </a:fontRef>
-        </p:style>
-        <p:txBody>
-          <a:bodyPr rtlCol="0" anchor="ctr"/>
-          <a:lstStyle/>
-          <a:p>
-            <a:pPr algn="ctr"/>
-            <a:endParaRPr lang="en-US"/>
-          </a:p>
-        </p:txBody>
-      </p:sp>
-      <p:sp>
-        <p:nvSpPr>
-          <p:cNvPr id="8" name="Rectangle 9"/>
-          <p:cNvSpPr/>
+        </p:spPr>
+        <p:txBody>
+          <a:bodyPr bIns="91440" anchor="b" anchorCtr="0">
+            <a:noAutofit/>
+          </a:bodyPr>
+          <a:lstStyle>
+            <a:lvl1pPr>
+              <a:spcBef>
+                <a:spcPct val="0"/>
+              </a:spcBef>
+              <a:buNone/>
+              <a:defRPr kumimoji="0" sz="2400">
+                <a:ln w="0"/>
+                <a:solidFill>
+                  <a:schemeClr val="tx2"/>
+                </a:solidFill>
+                <a:effectLst>
+                  <a:outerShdw blurRad="38100" dist="19050" dir="2700000" algn="tl" rotWithShape="0">
+                    <a:schemeClr val="dk1">
+                      <a:alpha val="40000"/>
+                    </a:schemeClr>
+                  </a:outerShdw>
+                </a:effectLst>
+                <a:latin typeface="+mj-lt"/>
+                <a:ea typeface="+mj-ea"/>
+                <a:cs typeface="+mj-cs"/>
+              </a:defRPr>
+            </a:lvl1pPr>
+          </a:lstStyle>
+          <a:p>
+            <a:r>
+              <a:rPr lang="es-PE" altLang="en-US" dirty="0"/>
+              <a:t>Ejemplo 2 : Modelo para fabricación</a:t>
+            </a:r>
+          </a:p>
+        </p:txBody>
+      </p:sp>
+      <p:sp>
+        <p:nvSpPr>
+          <p:cNvPr id="5" name="CuadroTexto 4"/>
+          <p:cNvSpPr txBox="1"/>
           <p:nvPr/>
         </p:nvSpPr>
         <p:spPr>
           <a:xfrm>
-            <a:off x="4887766" y="2996818"/>
-            <a:ext cx="1475975" cy="872476"/>
+            <a:off x="602191" y="836712"/>
+            <a:ext cx="8002257" cy="400110"/>
           </a:xfrm>
           <a:prstGeom prst="rect">
             <a:avLst/>
           </a:prstGeom>
-          <a:solidFill>
-            <a:schemeClr val="tx2">
-              <a:lumMod val="40000"/>
-              <a:lumOff val="60000"/>
-              <a:alpha val="17000"/>
-            </a:schemeClr>
-          </a:solidFill>
-          <a:ln>
-            <a:solidFill>
-              <a:schemeClr val="bg1"/>
-            </a:solidFill>
-          </a:ln>
-        </p:spPr>
-        <p:style>
-          <a:lnRef idx="2">
-            <a:schemeClr val="accent1">
-              <a:shade val="50000"/>
-            </a:schemeClr>
-          </a:lnRef>
-          <a:fillRef idx="1">
-            <a:schemeClr val="accent1"/>
-          </a:fillRef>
-          <a:effectRef idx="0">
-            <a:schemeClr val="accent1"/>
-          </a:effectRef>
-          <a:fontRef idx="minor">
-            <a:schemeClr val="lt1"/>
-          </a:fontRef>
-        </p:style>
-        <p:txBody>
-          <a:bodyPr rtlCol="0" anchor="ctr"/>
-          <a:lstStyle/>
-          <a:p>
-            <a:pPr algn="ctr"/>
-            <a:endParaRPr lang="en-US"/>
-          </a:p>
-        </p:txBody>
-      </p:sp>
-      <p:sp>
-        <p:nvSpPr>
-          <p:cNvPr id="26" name="Hexagon 9"/>
-          <p:cNvSpPr/>
+          <a:noFill/>
+        </p:spPr>
+        <p:txBody>
+          <a:bodyPr wrap="square" rtlCol="0">
+            <a:spAutoFit/>
+          </a:bodyPr>
+          <a:lstStyle/>
+          <a:p>
+            <a:pPr marL="285750" indent="-285750">
+              <a:buFont typeface="Arial" panose="020B0604020202020204" pitchFamily="34" charset="0"/>
+              <a:buChar char="•"/>
+            </a:pPr>
+            <a:r>
+              <a:rPr lang="es-MX" sz="2000" dirty="0"/>
+              <a:t>Se desean construir</a:t>
+            </a:r>
+            <a:endParaRPr lang="es-PE" sz="2000" dirty="0"/>
+          </a:p>
+        </p:txBody>
+      </p:sp>
+      <p:graphicFrame>
+        <p:nvGraphicFramePr>
+          <p:cNvPr id="4" name="Tabla 3"/>
+          <p:cNvGraphicFramePr>
+            <a:graphicFrameLocks noGrp="1"/>
+          </p:cNvGraphicFramePr>
           <p:nvPr/>
-        </p:nvSpPr>
-        <p:spPr>
-          <a:xfrm>
-            <a:off x="2295478" y="1358596"/>
-            <a:ext cx="1802054" cy="1463387"/>
-          </a:xfrm>
-          <a:prstGeom prst="hexagon">
+        </p:nvGraphicFramePr>
+        <p:xfrm>
+          <a:off x="1323954" y="2351103"/>
+          <a:ext cx="6558729" cy="1112520"/>
+        </p:xfrm>
+        <a:graphic>
+          <a:graphicData uri="http://schemas.openxmlformats.org/drawingml/2006/table">
+            <a:tbl>
+              <a:tblPr firstRow="1" bandRow="1">
+                <a:tableStyleId>{69012ECD-51FC-41F1-AA8D-1B2483CD663E}</a:tableStyleId>
+              </a:tblPr>
+              <a:tblGrid>
+                <a:gridCol w="2169609">
+                  <a:extLst>
+                    <a:ext uri="{9D8B030D-6E8A-4147-A177-3AD203B41FA5}">
+                      <a16:colId xmlns:a16="http://schemas.microsoft.com/office/drawing/2014/main" val="1387785101"/>
+                    </a:ext>
+                  </a:extLst>
+                </a:gridCol>
+                <a:gridCol w="1463040">
+                  <a:extLst>
+                    <a:ext uri="{9D8B030D-6E8A-4147-A177-3AD203B41FA5}">
+                      <a16:colId xmlns:a16="http://schemas.microsoft.com/office/drawing/2014/main" val="862367707"/>
+                    </a:ext>
+                  </a:extLst>
+                </a:gridCol>
+                <a:gridCol w="1463040">
+                  <a:extLst>
+                    <a:ext uri="{9D8B030D-6E8A-4147-A177-3AD203B41FA5}">
+                      <a16:colId xmlns:a16="http://schemas.microsoft.com/office/drawing/2014/main" val="3989843849"/>
+                    </a:ext>
+                  </a:extLst>
+                </a:gridCol>
+                <a:gridCol w="1463040">
+                  <a:extLst>
+                    <a:ext uri="{9D8B030D-6E8A-4147-A177-3AD203B41FA5}">
+                      <a16:colId xmlns:a16="http://schemas.microsoft.com/office/drawing/2014/main" val="3980836442"/>
+                    </a:ext>
+                  </a:extLst>
+                </a:gridCol>
+              </a:tblGrid>
+              <a:tr h="370840">
+                <a:tc>
+                  <a:txBody>
+                    <a:bodyPr/>
+                    <a:lstStyle/>
+                    <a:p>
+                      <a:endParaRPr lang="es-PE" dirty="0"/>
+                    </a:p>
+                  </a:txBody>
+                  <a:tcPr/>
+                </a:tc>
+                <a:tc>
+                  <a:txBody>
+                    <a:bodyPr/>
+                    <a:lstStyle/>
+                    <a:p>
+                      <a:pPr algn="ctr"/>
+                      <a:r>
+                        <a:rPr lang="es-PE" dirty="0"/>
+                        <a:t>Gasolina</a:t>
+                      </a:r>
+                    </a:p>
+                  </a:txBody>
+                  <a:tcPr/>
+                </a:tc>
+                <a:tc>
+                  <a:txBody>
+                    <a:bodyPr/>
+                    <a:lstStyle/>
+                    <a:p>
+                      <a:pPr algn="ctr"/>
+                      <a:r>
+                        <a:rPr lang="es-PE" dirty="0"/>
+                        <a:t>Kerosene</a:t>
+                      </a:r>
+                    </a:p>
+                  </a:txBody>
+                  <a:tcPr/>
+                </a:tc>
+                <a:tc>
+                  <a:txBody>
+                    <a:bodyPr/>
+                    <a:lstStyle/>
+                    <a:p>
+                      <a:pPr algn="ctr"/>
+                      <a:r>
+                        <a:rPr lang="es-PE" dirty="0"/>
+                        <a:t>Combustible</a:t>
+                      </a:r>
+                    </a:p>
+                  </a:txBody>
+                  <a:tcPr/>
+                </a:tc>
+                <a:extLst>
+                  <a:ext uri="{0D108BD9-81ED-4DB2-BD59-A6C34878D82A}">
+                    <a16:rowId xmlns:a16="http://schemas.microsoft.com/office/drawing/2014/main" val="385669016"/>
+                  </a:ext>
+                </a:extLst>
+              </a:tr>
+              <a:tr h="370840">
+                <a:tc>
+                  <a:txBody>
+                    <a:bodyPr/>
+                    <a:lstStyle/>
+                    <a:p>
+                      <a:r>
+                        <a:rPr lang="es-PE" dirty="0"/>
+                        <a:t>Petróleo</a:t>
+                      </a:r>
+                      <a:r>
+                        <a:rPr lang="es-PE" baseline="0" dirty="0"/>
+                        <a:t> crudo ligero</a:t>
+                      </a:r>
+                      <a:endParaRPr lang="es-PE" dirty="0"/>
+                    </a:p>
+                  </a:txBody>
+                  <a:tcPr/>
+                </a:tc>
+                <a:tc>
+                  <a:txBody>
+                    <a:bodyPr/>
+                    <a:lstStyle/>
+                    <a:p>
+                      <a:pPr algn="ctr"/>
+                      <a:r>
+                        <a:rPr lang="es-PE" dirty="0"/>
+                        <a:t>0.40</a:t>
+                      </a:r>
+                    </a:p>
+                  </a:txBody>
+                  <a:tcPr/>
+                </a:tc>
+                <a:tc>
+                  <a:txBody>
+                    <a:bodyPr/>
+                    <a:lstStyle/>
+                    <a:p>
+                      <a:pPr algn="ctr"/>
+                      <a:r>
+                        <a:rPr lang="es-PE" dirty="0"/>
+                        <a:t>0.20</a:t>
+                      </a:r>
+                    </a:p>
+                  </a:txBody>
+                  <a:tcPr/>
+                </a:tc>
+                <a:tc>
+                  <a:txBody>
+                    <a:bodyPr/>
+                    <a:lstStyle/>
+                    <a:p>
+                      <a:pPr algn="ctr"/>
+                      <a:r>
+                        <a:rPr lang="es-PE" dirty="0"/>
+                        <a:t>0.35</a:t>
+                      </a:r>
+                    </a:p>
+                  </a:txBody>
+                  <a:tcPr/>
+                </a:tc>
+                <a:extLst>
+                  <a:ext uri="{0D108BD9-81ED-4DB2-BD59-A6C34878D82A}">
+                    <a16:rowId xmlns:a16="http://schemas.microsoft.com/office/drawing/2014/main" val="1803704957"/>
+                  </a:ext>
+                </a:extLst>
+              </a:tr>
+              <a:tr h="370840">
+                <a:tc>
+                  <a:txBody>
+                    <a:bodyPr/>
+                    <a:lstStyle/>
+                    <a:p>
+                      <a:r>
+                        <a:rPr lang="es-PE" dirty="0"/>
+                        <a:t>Petróleo</a:t>
+                      </a:r>
+                      <a:r>
+                        <a:rPr lang="es-PE" baseline="0" dirty="0"/>
+                        <a:t> crudo pesado</a:t>
+                      </a:r>
+                      <a:endParaRPr lang="es-PE" dirty="0"/>
+                    </a:p>
+                  </a:txBody>
+                  <a:tcPr/>
+                </a:tc>
+                <a:tc>
+                  <a:txBody>
+                    <a:bodyPr/>
+                    <a:lstStyle/>
+                    <a:p>
+                      <a:pPr algn="ctr"/>
+                      <a:r>
+                        <a:rPr lang="es-PE" dirty="0"/>
+                        <a:t>0.32</a:t>
+                      </a:r>
+                    </a:p>
+                  </a:txBody>
+                  <a:tcPr/>
+                </a:tc>
+                <a:tc>
+                  <a:txBody>
+                    <a:bodyPr/>
+                    <a:lstStyle/>
+                    <a:p>
+                      <a:pPr algn="ctr"/>
+                      <a:r>
+                        <a:rPr lang="es-PE" dirty="0"/>
+                        <a:t>0.40</a:t>
+                      </a:r>
+                    </a:p>
+                  </a:txBody>
+                  <a:tcPr/>
+                </a:tc>
+                <a:tc>
+                  <a:txBody>
+                    <a:bodyPr/>
+                    <a:lstStyle/>
+                    <a:p>
+                      <a:pPr algn="ctr"/>
+                      <a:r>
+                        <a:rPr lang="es-PE" dirty="0"/>
+                        <a:t>0.20</a:t>
+                      </a:r>
+                    </a:p>
+                  </a:txBody>
+                  <a:tcPr/>
+                </a:tc>
+                <a:extLst>
+                  <a:ext uri="{0D108BD9-81ED-4DB2-BD59-A6C34878D82A}">
+                    <a16:rowId xmlns:a16="http://schemas.microsoft.com/office/drawing/2014/main" val="3361610549"/>
+                  </a:ext>
+                </a:extLst>
+              </a:tr>
+            </a:tbl>
+          </a:graphicData>
+        </a:graphic>
+      </p:graphicFrame>
+      <p:sp>
+        <p:nvSpPr>
+          <p:cNvPr id="6" name="CuadroTexto 5"/>
+          <p:cNvSpPr txBox="1"/>
+          <p:nvPr/>
+        </p:nvSpPr>
+        <p:spPr>
+          <a:xfrm>
+            <a:off x="602191" y="3654575"/>
+            <a:ext cx="8002257" cy="2246769"/>
+          </a:xfrm>
+          <a:prstGeom prst="rect">
             <a:avLst/>
           </a:prstGeom>
-          <a:ln/>
-        </p:spPr>
-        <p:style>
-          <a:lnRef idx="1">
-            <a:schemeClr val="dk1"/>
-          </a:lnRef>
-          <a:fillRef idx="2">
-            <a:schemeClr val="dk1"/>
-          </a:fillRef>
-          <a:effectRef idx="1">
-            <a:schemeClr val="dk1"/>
-          </a:effectRef>
-          <a:fontRef idx="minor">
-            <a:schemeClr val="dk1"/>
-          </a:fontRef>
-        </p:style>
-        <p:txBody>
-          <a:bodyPr rtlCol="0" anchor="ctr"/>
-          <a:lstStyle/>
-          <a:p>
-            <a:pPr algn="ctr"/>
-            <a:r>
-              <a:rPr lang="en-US" sz="1200" dirty="0">
-                <a:solidFill>
-                  <a:schemeClr val="tx1"/>
-                </a:solidFill>
-                <a:latin typeface="Oswald" panose="02000506000000020004" pitchFamily="50"/>
-              </a:rPr>
-              <a:t>Power System Optimization</a:t>
-            </a:r>
-            <a:endParaRPr lang="en-US" sz="900" dirty="0">
-              <a:solidFill>
-                <a:schemeClr val="tx1"/>
-              </a:solidFill>
-              <a:latin typeface="Oswald" panose="02000506000000020004" pitchFamily="50"/>
-            </a:endParaRPr>
-          </a:p>
-        </p:txBody>
-      </p:sp>
-      <p:sp>
-        <p:nvSpPr>
-          <p:cNvPr id="30" name="Hexagon 9"/>
-          <p:cNvSpPr/>
-          <p:nvPr/>
-        </p:nvSpPr>
-        <p:spPr>
-          <a:xfrm>
-            <a:off x="3793779" y="2158930"/>
-            <a:ext cx="1802054" cy="1463387"/>
-          </a:xfrm>
-          <a:prstGeom prst="hexagon">
-            <a:avLst/>
-          </a:prstGeom>
-          <a:ln/>
-        </p:spPr>
-        <p:style>
-          <a:lnRef idx="1">
-            <a:schemeClr val="accent6"/>
-          </a:lnRef>
-          <a:fillRef idx="2">
-            <a:schemeClr val="accent6"/>
-          </a:fillRef>
-          <a:effectRef idx="1">
-            <a:schemeClr val="accent6"/>
-          </a:effectRef>
-          <a:fontRef idx="minor">
-            <a:schemeClr val="dk1"/>
-          </a:fontRef>
-        </p:style>
-        <p:txBody>
-          <a:bodyPr rtlCol="0" anchor="ctr"/>
-          <a:lstStyle/>
-          <a:p>
-            <a:pPr algn="ctr"/>
-            <a:r>
-              <a:rPr lang="en-US" sz="2400" dirty="0">
-                <a:solidFill>
-                  <a:schemeClr val="tx1"/>
-                </a:solidFill>
-                <a:latin typeface="Oswald" panose="02000506000000020004" pitchFamily="50"/>
-              </a:rPr>
-              <a:t>Outline</a:t>
-            </a:r>
-            <a:endParaRPr lang="en-US" sz="1400" dirty="0">
-              <a:solidFill>
-                <a:schemeClr val="tx1"/>
-              </a:solidFill>
-              <a:latin typeface="Oswald" panose="02000506000000020004" pitchFamily="50"/>
-            </a:endParaRPr>
-          </a:p>
-        </p:txBody>
-      </p:sp>
-      <p:sp>
-        <p:nvSpPr>
-          <p:cNvPr id="31" name="Hexagon 9"/>
-          <p:cNvSpPr/>
-          <p:nvPr/>
-        </p:nvSpPr>
-        <p:spPr>
-          <a:xfrm>
-            <a:off x="2293624" y="2927791"/>
-            <a:ext cx="1802054" cy="1463387"/>
-          </a:xfrm>
-          <a:prstGeom prst="hexagon">
-            <a:avLst/>
-          </a:prstGeom>
-          <a:ln/>
-        </p:spPr>
-        <p:style>
-          <a:lnRef idx="1">
-            <a:schemeClr val="accent1"/>
-          </a:lnRef>
-          <a:fillRef idx="2">
-            <a:schemeClr val="accent1"/>
-          </a:fillRef>
-          <a:effectRef idx="1">
-            <a:schemeClr val="accent1"/>
-          </a:effectRef>
-          <a:fontRef idx="minor">
-            <a:schemeClr val="dk1"/>
-          </a:fontRef>
-        </p:style>
-        <p:txBody>
-          <a:bodyPr rtlCol="0" anchor="ctr"/>
-          <a:lstStyle/>
-          <a:p>
-            <a:pPr algn="ctr"/>
-            <a:r>
-              <a:rPr lang="en-US" sz="1200" dirty="0">
-                <a:solidFill>
-                  <a:schemeClr val="tx1"/>
-                </a:solidFill>
-                <a:latin typeface="Oswald" panose="02000506000000020004" pitchFamily="50"/>
-              </a:rPr>
-              <a:t>Semidefinite Relaxation</a:t>
-            </a:r>
-          </a:p>
-          <a:p>
-            <a:pPr algn="ctr"/>
-            <a:r>
-              <a:rPr lang="en-US" sz="1200" dirty="0">
-                <a:solidFill>
-                  <a:schemeClr val="tx1"/>
-                </a:solidFill>
-                <a:latin typeface="Oswald" panose="02000506000000020004" pitchFamily="50"/>
-              </a:rPr>
-              <a:t> (SDP)</a:t>
-            </a:r>
-          </a:p>
-        </p:txBody>
-      </p:sp>
-      <p:sp>
-        <p:nvSpPr>
-          <p:cNvPr id="33" name="Hexagon 9"/>
-          <p:cNvSpPr/>
-          <p:nvPr/>
-        </p:nvSpPr>
-        <p:spPr>
-          <a:xfrm>
-            <a:off x="5292080" y="1358596"/>
-            <a:ext cx="1802054" cy="1463387"/>
-          </a:xfrm>
-          <a:prstGeom prst="hexagon">
-            <a:avLst/>
-          </a:prstGeom>
-          <a:ln/>
-        </p:spPr>
-        <p:style>
-          <a:lnRef idx="1">
-            <a:schemeClr val="accent2"/>
-          </a:lnRef>
-          <a:fillRef idx="2">
-            <a:schemeClr val="accent2"/>
-          </a:fillRef>
-          <a:effectRef idx="1">
-            <a:schemeClr val="accent2"/>
-          </a:effectRef>
-          <a:fontRef idx="minor">
-            <a:schemeClr val="dk1"/>
-          </a:fontRef>
-        </p:style>
-        <p:txBody>
-          <a:bodyPr rtlCol="0" anchor="ctr"/>
-          <a:lstStyle/>
-          <a:p>
-            <a:pPr algn="ctr"/>
-            <a:r>
-              <a:rPr lang="en-US" sz="1200" dirty="0">
-                <a:solidFill>
-                  <a:schemeClr val="tx1"/>
-                </a:solidFill>
-                <a:latin typeface="Oswald" panose="02000506000000020004" pitchFamily="50"/>
-              </a:rPr>
-              <a:t>Results</a:t>
-            </a:r>
-          </a:p>
-        </p:txBody>
-      </p:sp>
-      <p:sp>
-        <p:nvSpPr>
-          <p:cNvPr id="34" name="Hexagon 9"/>
-          <p:cNvSpPr/>
-          <p:nvPr/>
-        </p:nvSpPr>
-        <p:spPr>
-          <a:xfrm>
-            <a:off x="3793779" y="3690957"/>
-            <a:ext cx="1802054" cy="1463387"/>
-          </a:xfrm>
-          <a:prstGeom prst="hexagon">
-            <a:avLst/>
-          </a:prstGeom>
-          <a:ln/>
-        </p:spPr>
-        <p:style>
-          <a:lnRef idx="1">
-            <a:schemeClr val="accent4"/>
-          </a:lnRef>
-          <a:fillRef idx="2">
-            <a:schemeClr val="accent4"/>
-          </a:fillRef>
-          <a:effectRef idx="1">
-            <a:schemeClr val="accent4"/>
-          </a:effectRef>
-          <a:fontRef idx="minor">
-            <a:schemeClr val="dk1"/>
-          </a:fontRef>
-        </p:style>
-        <p:txBody>
-          <a:bodyPr rtlCol="0" anchor="ctr"/>
-          <a:lstStyle/>
-          <a:p>
-            <a:pPr algn="ctr"/>
-            <a:r>
-              <a:rPr lang="en-US" sz="1200" dirty="0">
-                <a:solidFill>
-                  <a:schemeClr val="tx1"/>
-                </a:solidFill>
-                <a:latin typeface="Oswald" panose="02000506000000020004" pitchFamily="50"/>
-              </a:rPr>
-              <a:t>A SDP Formulation for the AC-OPF</a:t>
-            </a:r>
-          </a:p>
-        </p:txBody>
-      </p:sp>
-      <p:sp>
-        <p:nvSpPr>
-          <p:cNvPr id="37" name="Hexagon 9"/>
-          <p:cNvSpPr/>
-          <p:nvPr/>
-        </p:nvSpPr>
-        <p:spPr>
-          <a:xfrm>
-            <a:off x="5292080" y="2924944"/>
-            <a:ext cx="1802054" cy="1463387"/>
-          </a:xfrm>
-          <a:prstGeom prst="hexagon">
-            <a:avLst/>
-          </a:prstGeom>
-          <a:ln/>
-        </p:spPr>
-        <p:style>
-          <a:lnRef idx="1">
-            <a:schemeClr val="accent3"/>
-          </a:lnRef>
-          <a:fillRef idx="2">
-            <a:schemeClr val="accent3"/>
-          </a:fillRef>
-          <a:effectRef idx="1">
-            <a:schemeClr val="accent3"/>
-          </a:effectRef>
-          <a:fontRef idx="minor">
-            <a:schemeClr val="dk1"/>
-          </a:fontRef>
-        </p:style>
-        <p:txBody>
-          <a:bodyPr rtlCol="0" anchor="ctr"/>
-          <a:lstStyle/>
-          <a:p>
-            <a:pPr algn="ctr"/>
-            <a:r>
-              <a:rPr lang="en-US" sz="1200" dirty="0">
-                <a:solidFill>
-                  <a:schemeClr val="tx1"/>
-                </a:solidFill>
-                <a:latin typeface="Oswald" panose="02000506000000020004" pitchFamily="50"/>
-              </a:rPr>
-              <a:t>ACTNEP &amp; RPP</a:t>
-            </a:r>
+          <a:noFill/>
+        </p:spPr>
+        <p:txBody>
+          <a:bodyPr wrap="square" rtlCol="0">
+            <a:spAutoFit/>
+          </a:bodyPr>
+          <a:lstStyle/>
+          <a:p>
+            <a:pPr marL="285750" indent="-285750">
+              <a:buFont typeface="Arial" panose="020B0604020202020204" pitchFamily="34" charset="0"/>
+              <a:buChar char="•"/>
+            </a:pPr>
+            <a:r>
+              <a:rPr lang="es-MX" sz="2000" dirty="0"/>
+              <a:t>En el proceso de refinamiento se pierde el 5 % y el 8 % del crudo, respectivamente. </a:t>
+            </a:r>
+          </a:p>
+          <a:p>
+            <a:pPr marL="285750" indent="-285750">
+              <a:buFont typeface="Arial" panose="020B0604020202020204" pitchFamily="34" charset="0"/>
+              <a:buChar char="•"/>
+            </a:pPr>
+            <a:r>
+              <a:rPr lang="es-MX" sz="2000" dirty="0"/>
+              <a:t>La refinería tiene un contrato para entregar un millón de barriles de gasolina, cuatrocientos mil barriles de keroseno, y doscientos cincuenta mil barriles de combustible para reactores. </a:t>
+            </a:r>
+          </a:p>
+          <a:p>
+            <a:pPr marL="285750" indent="-285750">
+              <a:buFont typeface="Arial" panose="020B0604020202020204" pitchFamily="34" charset="0"/>
+              <a:buChar char="•"/>
+            </a:pPr>
+            <a:r>
+              <a:rPr lang="es-MX" sz="2000" dirty="0"/>
+              <a:t>Determine el número de barriles de cada tipo de petróleo crudo que satisfacen la demanda y minimizan el coste. </a:t>
+            </a:r>
+            <a:endParaRPr lang="es-PE" sz="2000" dirty="0"/>
           </a:p>
         </p:txBody>
       </p:sp>
     </p:spTree>
     <p:extLst>
       <p:ext uri="{BB962C8B-B14F-4D97-AF65-F5344CB8AC3E}">
-        <p14:creationId xmlns:p14="http://schemas.microsoft.com/office/powerpoint/2010/main" val="1870165306"/>
+        <p14:creationId xmlns:p14="http://schemas.microsoft.com/office/powerpoint/2010/main" val="978993721"/>
       </p:ext>
     </p:extLst>
   </p:cSld>
   <p:clrMapOvr>
     <a:masterClrMapping/>
   </p:clrMapOvr>
-  <mc:AlternateContent xmlns:mc="http://schemas.openxmlformats.org/markup-compatibility/2006" xmlns:p14="http://schemas.microsoft.com/office/powerpoint/2010/main">
-    <mc:Choice Requires="p14">
-      <p:transition spd="med" p14:dur="700">
-        <p:fade/>
-      </p:transition>
-    </mc:Choice>
-    <mc:Fallback xmlns="">
-      <p:transition spd="med">
-        <p:fade/>
-      </p:transition>
-    </mc:Fallback>
-  </mc:AlternateContent>
-</p:sld>
-</file>
-
-<file path=ppt/slides/slide4.xml><?xml version="1.0" encoding="utf-8"?>
-<p:sld xmlns:a="http://schemas.openxmlformats.org/drawingml/2006/main" xmlns:r="http://schemas.openxmlformats.org/officeDocument/2006/relationships" xmlns:p="http://schemas.openxmlformats.org/presentationml/2006/main">
-  <p:cSld>
-    <p:spTree>
-      <p:nvGrpSpPr>
-        <p:cNvPr id="1" name=""/>
-        <p:cNvGrpSpPr/>
-        <p:nvPr/>
-      </p:nvGrpSpPr>
-      <p:grpSpPr>
-        <a:xfrm>
-          <a:off x="0" y="0"/>
-          <a:ext cx="0" cy="0"/>
-          <a:chOff x="0" y="0"/>
-          <a:chExt cx="0" cy="0"/>
-        </a:xfrm>
-      </p:grpSpPr>
-      <p:sp>
-        <p:nvSpPr>
-          <p:cNvPr id="3" name="Marcador de número de diapositiva 2"/>
-          <p:cNvSpPr>
-            <a:spLocks noGrp="1"/>
-          </p:cNvSpPr>
-          <p:nvPr>
-            <p:ph type="sldNum" sz="quarter" idx="12"/>
-          </p:nvPr>
-        </p:nvSpPr>
-        <p:spPr/>
-        <p:txBody>
-          <a:bodyPr/>
-          <a:lstStyle/>
-          <a:p>
-            <a:fld id="{64BD7E74-CBD2-4D88-9109-2EA8081AE675}" type="slidenum">
-              <a:rPr lang="es-ES" smtClean="0"/>
-              <a:pPr/>
-              <a:t>4</a:t>
-            </a:fld>
-            <a:endParaRPr lang="es-ES"/>
-          </a:p>
-        </p:txBody>
-      </p:sp>
-      <p:sp>
-        <p:nvSpPr>
-          <p:cNvPr id="7" name="TextBox 3"/>
-          <p:cNvSpPr txBox="1"/>
-          <p:nvPr/>
-        </p:nvSpPr>
-        <p:spPr>
-          <a:xfrm>
-            <a:off x="755576" y="1138137"/>
-            <a:ext cx="6459790" cy="1077218"/>
-          </a:xfrm>
-          <a:prstGeom prst="rect">
-            <a:avLst/>
-          </a:prstGeom>
-          <a:noFill/>
-        </p:spPr>
-        <p:txBody>
-          <a:bodyPr wrap="square" rtlCol="0">
-            <a:spAutoFit/>
-          </a:bodyPr>
-          <a:lstStyle/>
-          <a:p>
-            <a:pPr defTabSz="457200"/>
-            <a:r>
-              <a:rPr lang="en-US" sz="3200" i="1" dirty="0">
-                <a:solidFill>
-                  <a:srgbClr val="E7E6E6">
-                    <a:lumMod val="50000"/>
-                  </a:srgbClr>
-                </a:solidFill>
-                <a:latin typeface="Adobe Hebrew" panose="02040503050201020203" pitchFamily="18" charset="-79"/>
-                <a:cs typeface="Adobe Hebrew" panose="02040503050201020203" pitchFamily="18" charset="-79"/>
-              </a:rPr>
-              <a:t>“The new becomes old, and the old becomes new…a life cycle”</a:t>
-            </a:r>
-          </a:p>
-        </p:txBody>
-      </p:sp>
-      <p:pic>
-        <p:nvPicPr>
-          <p:cNvPr id="2" name="Imagen 1"/>
-          <p:cNvPicPr>
-            <a:picLocks noChangeAspect="1"/>
-          </p:cNvPicPr>
-          <p:nvPr/>
-        </p:nvPicPr>
-        <p:blipFill>
-          <a:blip r:embed="rId2">
-            <a:extLst>
-              <a:ext uri="{28A0092B-C50C-407E-A947-70E740481C1C}">
-                <a14:useLocalDpi xmlns:a14="http://schemas.microsoft.com/office/drawing/2010/main" val="0"/>
-              </a:ext>
-            </a:extLst>
-          </a:blip>
-          <a:stretch>
-            <a:fillRect/>
-          </a:stretch>
-        </p:blipFill>
-        <p:spPr>
-          <a:xfrm>
-            <a:off x="3275856" y="2564904"/>
-            <a:ext cx="4980435" cy="3512244"/>
-          </a:xfrm>
-          <a:prstGeom prst="rect">
-            <a:avLst/>
-          </a:prstGeom>
-        </p:spPr>
-      </p:pic>
-    </p:spTree>
-    <p:extLst>
-      <p:ext uri="{BB962C8B-B14F-4D97-AF65-F5344CB8AC3E}">
-        <p14:creationId xmlns:p14="http://schemas.microsoft.com/office/powerpoint/2010/main" val="3103930866"/>
-      </p:ext>
-    </p:extLst>
-  </p:cSld>
-  <p:clrMapOvr>
-    <a:masterClrMapping/>
-  </p:clrMapOvr>
-  <mc:AlternateContent xmlns:mc="http://schemas.openxmlformats.org/markup-compatibility/2006" xmlns:p14="http://schemas.microsoft.com/office/powerpoint/2010/main">
-    <mc:Choice Requires="p14">
-      <p:transition p14:dur="10"/>
-    </mc:Choice>
-    <mc:Fallback xmlns="">
-      <p:transition/>
-    </mc:Fallback>
-  </mc:AlternateContent>
+  <p:transition spd="slow">
+    <p:fade/>
+  </p:transition>
 </p:sld>
 </file>
 

</xml_diff>